<commit_message>
Create : User DB Table
</commit_message>
<xml_diff>
--- a/202131205_김승진_실무게임프로그래밍_기획서.pptx
+++ b/202131205_김승진_실무게임프로그래밍_기획서.pptx
@@ -261,7 +261,7 @@
           <a:p>
             <a:fld id="{16DB16CA-D4AF-495C-A36B-A16844DE5D9E}" type="datetimeFigureOut">
               <a:rPr lang="ko-KR" altLang="en-US" smtClean="0"/>
-              <a:t>2022. 9. 21.</a:t>
+              <a:t>2022-09-22</a:t>
             </a:fld>
             <a:endParaRPr lang="ko-KR" altLang="en-US"/>
           </a:p>
@@ -429,7 +429,7 @@
           <a:p>
             <a:fld id="{16DB16CA-D4AF-495C-A36B-A16844DE5D9E}" type="datetimeFigureOut">
               <a:rPr lang="ko-KR" altLang="en-US" smtClean="0"/>
-              <a:t>2022. 9. 21.</a:t>
+              <a:t>2022-09-22</a:t>
             </a:fld>
             <a:endParaRPr lang="ko-KR" altLang="en-US"/>
           </a:p>
@@ -607,7 +607,7 @@
           <a:p>
             <a:fld id="{16DB16CA-D4AF-495C-A36B-A16844DE5D9E}" type="datetimeFigureOut">
               <a:rPr lang="ko-KR" altLang="en-US" smtClean="0"/>
-              <a:t>2022. 9. 21.</a:t>
+              <a:t>2022-09-22</a:t>
             </a:fld>
             <a:endParaRPr lang="ko-KR" altLang="en-US"/>
           </a:p>
@@ -775,7 +775,7 @@
           <a:p>
             <a:fld id="{16DB16CA-D4AF-495C-A36B-A16844DE5D9E}" type="datetimeFigureOut">
               <a:rPr lang="ko-KR" altLang="en-US" smtClean="0"/>
-              <a:t>2022. 9. 21.</a:t>
+              <a:t>2022-09-22</a:t>
             </a:fld>
             <a:endParaRPr lang="ko-KR" altLang="en-US"/>
           </a:p>
@@ -1020,7 +1020,7 @@
           <a:p>
             <a:fld id="{16DB16CA-D4AF-495C-A36B-A16844DE5D9E}" type="datetimeFigureOut">
               <a:rPr lang="ko-KR" altLang="en-US" smtClean="0"/>
-              <a:t>2022. 9. 21.</a:t>
+              <a:t>2022-09-22</a:t>
             </a:fld>
             <a:endParaRPr lang="ko-KR" altLang="en-US"/>
           </a:p>
@@ -1249,7 +1249,7 @@
           <a:p>
             <a:fld id="{16DB16CA-D4AF-495C-A36B-A16844DE5D9E}" type="datetimeFigureOut">
               <a:rPr lang="ko-KR" altLang="en-US" smtClean="0"/>
-              <a:t>2022. 9. 21.</a:t>
+              <a:t>2022-09-22</a:t>
             </a:fld>
             <a:endParaRPr lang="ko-KR" altLang="en-US"/>
           </a:p>
@@ -1613,7 +1613,7 @@
           <a:p>
             <a:fld id="{16DB16CA-D4AF-495C-A36B-A16844DE5D9E}" type="datetimeFigureOut">
               <a:rPr lang="ko-KR" altLang="en-US" smtClean="0"/>
-              <a:t>2022. 9. 21.</a:t>
+              <a:t>2022-09-22</a:t>
             </a:fld>
             <a:endParaRPr lang="ko-KR" altLang="en-US"/>
           </a:p>
@@ -1730,7 +1730,7 @@
           <a:p>
             <a:fld id="{16DB16CA-D4AF-495C-A36B-A16844DE5D9E}" type="datetimeFigureOut">
               <a:rPr lang="ko-KR" altLang="en-US" smtClean="0"/>
-              <a:t>2022. 9. 21.</a:t>
+              <a:t>2022-09-22</a:t>
             </a:fld>
             <a:endParaRPr lang="ko-KR" altLang="en-US"/>
           </a:p>
@@ -1825,7 +1825,7 @@
           <a:p>
             <a:fld id="{16DB16CA-D4AF-495C-A36B-A16844DE5D9E}" type="datetimeFigureOut">
               <a:rPr lang="ko-KR" altLang="en-US" smtClean="0"/>
-              <a:t>2022. 9. 21.</a:t>
+              <a:t>2022-09-22</a:t>
             </a:fld>
             <a:endParaRPr lang="ko-KR" altLang="en-US"/>
           </a:p>
@@ -2100,7 +2100,7 @@
           <a:p>
             <a:fld id="{16DB16CA-D4AF-495C-A36B-A16844DE5D9E}" type="datetimeFigureOut">
               <a:rPr lang="ko-KR" altLang="en-US" smtClean="0"/>
-              <a:t>2022. 9. 21.</a:t>
+              <a:t>2022-09-22</a:t>
             </a:fld>
             <a:endParaRPr lang="ko-KR" altLang="en-US"/>
           </a:p>
@@ -2352,7 +2352,7 @@
           <a:p>
             <a:fld id="{16DB16CA-D4AF-495C-A36B-A16844DE5D9E}" type="datetimeFigureOut">
               <a:rPr lang="ko-KR" altLang="en-US" smtClean="0"/>
-              <a:t>2022. 9. 21.</a:t>
+              <a:t>2022-09-22</a:t>
             </a:fld>
             <a:endParaRPr lang="ko-KR" altLang="en-US"/>
           </a:p>
@@ -2563,7 +2563,7 @@
           <a:p>
             <a:fld id="{16DB16CA-D4AF-495C-A36B-A16844DE5D9E}" type="datetimeFigureOut">
               <a:rPr lang="ko-KR" altLang="en-US" smtClean="0"/>
-              <a:t>2022. 9. 21.</a:t>
+              <a:t>2022-09-22</a:t>
             </a:fld>
             <a:endParaRPr lang="ko-KR" altLang="en-US"/>
           </a:p>
@@ -16371,16 +16371,8 @@
               <a:t>, </a:t>
             </a:r>
             <a:r>
-              <a:rPr lang="ko-KR" altLang="en-US" sz="2800" b="1" dirty="0"/>
-              <a:t>주문내역</a:t>
-            </a:r>
-            <a:r>
-              <a:rPr lang="en-US" altLang="ko-KR" sz="2800" b="1" dirty="0"/>
-              <a:t>, </a:t>
-            </a:r>
-            <a:r>
-              <a:rPr lang="ko-KR" altLang="en-US" sz="2800" b="1" dirty="0"/>
-              <a:t>찜 목록 등</a:t>
+              <a:rPr lang="ko-KR" altLang="en-US" sz="2800" b="1" dirty="0" smtClean="0"/>
+              <a:t>주문내역 등</a:t>
             </a:r>
             <a:r>
               <a:rPr lang="en-US" altLang="ko-KR" sz="2800" b="1" dirty="0"/>
@@ -16747,10 +16739,32 @@
           <a:lstStyle/>
           <a:p>
             <a:r>
-              <a:rPr lang="en-US" altLang="ko-KR" dirty="0"/>
-              <a:t>asd123</a:t>
-            </a:r>
-            <a:endParaRPr lang="ko-KR" altLang="en-US" dirty="0"/>
+              <a:rPr lang="ko-KR" altLang="en-US" dirty="0" smtClean="0">
+                <a:solidFill>
+                  <a:schemeClr val="bg1">
+                    <a:lumMod val="50000"/>
+                  </a:schemeClr>
+                </a:solidFill>
+              </a:rPr>
+              <a:t>이메일을 입력해주세요</a:t>
+            </a:r>
+            <a:r>
+              <a:rPr lang="en-US" altLang="ko-KR" dirty="0" smtClean="0">
+                <a:solidFill>
+                  <a:schemeClr val="bg1">
+                    <a:lumMod val="50000"/>
+                  </a:schemeClr>
+                </a:solidFill>
+              </a:rPr>
+              <a:t>.</a:t>
+            </a:r>
+            <a:endParaRPr lang="ko-KR" altLang="en-US" dirty="0">
+              <a:solidFill>
+                <a:schemeClr val="bg1">
+                  <a:lumMod val="50000"/>
+                </a:schemeClr>
+              </a:solidFill>
+            </a:endParaRPr>
           </a:p>
         </p:txBody>
       </p:sp>
@@ -16936,8 +16950,8 @@
         </p:nvSpPr>
         <p:spPr>
           <a:xfrm>
-            <a:off x="148243" y="1694586"/>
-            <a:ext cx="11729258" cy="5067559"/>
+            <a:off x="148242" y="1612669"/>
+            <a:ext cx="11880274" cy="5149476"/>
           </a:xfrm>
           <a:prstGeom prst="rect">
             <a:avLst/>
@@ -16979,7 +16993,7 @@
         </p:nvSpPr>
         <p:spPr>
           <a:xfrm>
-            <a:off x="3589712" y="3701976"/>
+            <a:off x="3564774" y="3391931"/>
             <a:ext cx="4089862" cy="462700"/>
           </a:xfrm>
           <a:prstGeom prst="rect">
@@ -17022,7 +17036,7 @@
         </p:nvSpPr>
         <p:spPr>
           <a:xfrm>
-            <a:off x="3589712" y="4192871"/>
+            <a:off x="3564774" y="3882826"/>
             <a:ext cx="4089862" cy="428322"/>
           </a:xfrm>
           <a:prstGeom prst="rect">
@@ -17065,7 +17079,7 @@
         </p:nvSpPr>
         <p:spPr>
           <a:xfrm>
-            <a:off x="3589712" y="6139693"/>
+            <a:off x="3564774" y="5829648"/>
             <a:ext cx="4089862" cy="540466"/>
           </a:xfrm>
           <a:prstGeom prst="rect">
@@ -17108,7 +17122,7 @@
         </p:nvSpPr>
         <p:spPr>
           <a:xfrm>
-            <a:off x="5044439" y="6170068"/>
+            <a:off x="5019501" y="5860023"/>
             <a:ext cx="1920240" cy="369332"/>
           </a:xfrm>
           <a:prstGeom prst="rect">
@@ -17137,7 +17151,7 @@
         </p:nvSpPr>
         <p:spPr>
           <a:xfrm>
-            <a:off x="3589712" y="4243255"/>
+            <a:off x="3564774" y="3933210"/>
             <a:ext cx="3883430" cy="369332"/>
           </a:xfrm>
           <a:prstGeom prst="rect">
@@ -17160,7 +17174,7 @@
                   </a:schemeClr>
                 </a:solidFill>
               </a:rPr>
-              <a:t>비밀번호를 한 번 더 입력해 주세요</a:t>
+              <a:t>비밀번호를 입력해 주세요</a:t>
             </a:r>
             <a:r>
               <a:rPr lang="en-US" altLang="ko-KR" dirty="0">
@@ -17215,13 +17229,13 @@
       </p:pic>
       <p:sp>
         <p:nvSpPr>
-          <p:cNvPr id="14" name="직사각형 13"/>
+          <p:cNvPr id="15" name="직사각형 14"/>
           <p:cNvSpPr/>
           <p:nvPr/>
         </p:nvSpPr>
         <p:spPr>
           <a:xfrm>
-            <a:off x="3589712" y="3214084"/>
+            <a:off x="3564774" y="4360594"/>
             <a:ext cx="4089862" cy="462700"/>
           </a:xfrm>
           <a:prstGeom prst="rect">
@@ -17258,56 +17272,13 @@
       </p:sp>
       <p:sp>
         <p:nvSpPr>
-          <p:cNvPr id="15" name="직사각형 14"/>
-          <p:cNvSpPr/>
-          <p:nvPr/>
-        </p:nvSpPr>
-        <p:spPr>
-          <a:xfrm>
-            <a:off x="3589712" y="4670639"/>
-            <a:ext cx="4089862" cy="462700"/>
-          </a:xfrm>
-          <a:prstGeom prst="rect">
-            <a:avLst/>
-          </a:prstGeom>
-          <a:solidFill>
-            <a:schemeClr val="bg1"/>
-          </a:solidFill>
-        </p:spPr>
-        <p:style>
-          <a:lnRef idx="2">
-            <a:schemeClr val="accent1">
-              <a:shade val="50000"/>
-            </a:schemeClr>
-          </a:lnRef>
-          <a:fillRef idx="1">
-            <a:schemeClr val="accent1"/>
-          </a:fillRef>
-          <a:effectRef idx="0">
-            <a:schemeClr val="accent1"/>
-          </a:effectRef>
-          <a:fontRef idx="minor">
-            <a:schemeClr val="lt1"/>
-          </a:fontRef>
-        </p:style>
-        <p:txBody>
-          <a:bodyPr rtlCol="0" anchor="ctr"/>
-          <a:lstStyle/>
-          <a:p>
-            <a:pPr algn="ctr"/>
-            <a:endParaRPr lang="ko-KR" altLang="en-US"/>
-          </a:p>
-        </p:txBody>
-      </p:sp>
-      <p:sp>
-        <p:nvSpPr>
           <p:cNvPr id="20" name="TextBox 19"/>
           <p:cNvSpPr txBox="1"/>
           <p:nvPr/>
         </p:nvSpPr>
         <p:spPr>
           <a:xfrm>
-            <a:off x="3589712" y="3760829"/>
+            <a:off x="3564774" y="3450784"/>
             <a:ext cx="2909454" cy="369332"/>
           </a:xfrm>
           <a:prstGeom prst="rect">
@@ -17321,6 +17292,17 @@
           </a:bodyPr>
           <a:lstStyle/>
           <a:p>
+            <a:r>
+              <a:rPr lang="ko-KR" altLang="en-US" dirty="0" smtClean="0">
+                <a:solidFill>
+                  <a:schemeClr val="tx1">
+                    <a:lumMod val="50000"/>
+                    <a:lumOff val="50000"/>
+                  </a:schemeClr>
+                </a:solidFill>
+              </a:rPr>
+              <a:t>이메일을 </a:t>
+            </a:r>
             <a:r>
               <a:rPr lang="ko-KR" altLang="en-US" dirty="0">
                 <a:solidFill>
@@ -17330,7 +17312,7 @@
                   </a:schemeClr>
                 </a:solidFill>
               </a:rPr>
-              <a:t>비밀번호를 입력해 주세요</a:t>
+              <a:t>입력해 주세요</a:t>
             </a:r>
             <a:r>
               <a:rPr lang="en-US" altLang="ko-KR" dirty="0">
@@ -17356,14 +17338,14 @@
       </p:sp>
       <p:sp>
         <p:nvSpPr>
-          <p:cNvPr id="23" name="TextBox 22"/>
-          <p:cNvSpPr txBox="1"/>
-          <p:nvPr/>
-        </p:nvSpPr>
-        <p:spPr>
-          <a:xfrm>
-            <a:off x="3589712" y="3290924"/>
-            <a:ext cx="2909454" cy="369332"/>
+          <p:cNvPr id="24" name="TextBox 23"/>
+          <p:cNvSpPr txBox="1"/>
+          <p:nvPr/>
+        </p:nvSpPr>
+        <p:spPr>
+          <a:xfrm>
+            <a:off x="3564774" y="4401140"/>
+            <a:ext cx="4089862" cy="369332"/>
           </a:xfrm>
           <a:prstGeom prst="rect">
             <a:avLst/>
@@ -17385,7 +17367,7 @@
                   </a:schemeClr>
                 </a:solidFill>
               </a:rPr>
-              <a:t>아이디를 입력해 주세요</a:t>
+              <a:t>비밀번호를 한 번 더 입력해 주세요</a:t>
             </a:r>
             <a:r>
               <a:rPr lang="en-US" altLang="ko-KR" dirty="0">
@@ -17411,13 +17393,99 @@
       </p:sp>
       <p:sp>
         <p:nvSpPr>
-          <p:cNvPr id="24" name="TextBox 23"/>
-          <p:cNvSpPr txBox="1"/>
-          <p:nvPr/>
-        </p:nvSpPr>
-        <p:spPr>
-          <a:xfrm>
-            <a:off x="3589712" y="4711185"/>
+          <p:cNvPr id="25" name="직사각형 24"/>
+          <p:cNvSpPr/>
+          <p:nvPr/>
+        </p:nvSpPr>
+        <p:spPr>
+          <a:xfrm>
+            <a:off x="3564774" y="4853490"/>
+            <a:ext cx="4089862" cy="462700"/>
+          </a:xfrm>
+          <a:prstGeom prst="rect">
+            <a:avLst/>
+          </a:prstGeom>
+          <a:solidFill>
+            <a:schemeClr val="bg1"/>
+          </a:solidFill>
+        </p:spPr>
+        <p:style>
+          <a:lnRef idx="2">
+            <a:schemeClr val="accent1">
+              <a:shade val="50000"/>
+            </a:schemeClr>
+          </a:lnRef>
+          <a:fillRef idx="1">
+            <a:schemeClr val="accent1"/>
+          </a:fillRef>
+          <a:effectRef idx="0">
+            <a:schemeClr val="accent1"/>
+          </a:effectRef>
+          <a:fontRef idx="minor">
+            <a:schemeClr val="lt1"/>
+          </a:fontRef>
+        </p:style>
+        <p:txBody>
+          <a:bodyPr rtlCol="0" anchor="ctr"/>
+          <a:lstStyle/>
+          <a:p>
+            <a:pPr algn="ctr"/>
+            <a:endParaRPr lang="ko-KR" altLang="en-US"/>
+          </a:p>
+        </p:txBody>
+      </p:sp>
+      <p:sp>
+        <p:nvSpPr>
+          <p:cNvPr id="26" name="직사각형 25"/>
+          <p:cNvSpPr/>
+          <p:nvPr/>
+        </p:nvSpPr>
+        <p:spPr>
+          <a:xfrm>
+            <a:off x="3564774" y="5346386"/>
+            <a:ext cx="4089862" cy="462700"/>
+          </a:xfrm>
+          <a:prstGeom prst="rect">
+            <a:avLst/>
+          </a:prstGeom>
+          <a:solidFill>
+            <a:schemeClr val="bg1"/>
+          </a:solidFill>
+        </p:spPr>
+        <p:style>
+          <a:lnRef idx="2">
+            <a:schemeClr val="accent1">
+              <a:shade val="50000"/>
+            </a:schemeClr>
+          </a:lnRef>
+          <a:fillRef idx="1">
+            <a:schemeClr val="accent1"/>
+          </a:fillRef>
+          <a:effectRef idx="0">
+            <a:schemeClr val="accent1"/>
+          </a:effectRef>
+          <a:fontRef idx="minor">
+            <a:schemeClr val="lt1"/>
+          </a:fontRef>
+        </p:style>
+        <p:txBody>
+          <a:bodyPr rtlCol="0" anchor="ctr"/>
+          <a:lstStyle/>
+          <a:p>
+            <a:pPr algn="ctr"/>
+            <a:endParaRPr lang="ko-KR" altLang="en-US"/>
+          </a:p>
+        </p:txBody>
+      </p:sp>
+      <p:sp>
+        <p:nvSpPr>
+          <p:cNvPr id="27" name="TextBox 26"/>
+          <p:cNvSpPr txBox="1"/>
+          <p:nvPr/>
+        </p:nvSpPr>
+        <p:spPr>
+          <a:xfrm>
+            <a:off x="3564774" y="4895068"/>
             <a:ext cx="3767052" cy="369332"/>
           </a:xfrm>
           <a:prstGeom prst="rect">
@@ -17440,7 +17508,7 @@
                   </a:schemeClr>
                 </a:solidFill>
               </a:rPr>
-              <a:t>이메일을 입력해 주세요</a:t>
+              <a:t>사용하실 닉네임을 입력해 주세요</a:t>
             </a:r>
             <a:r>
               <a:rPr lang="en-US" altLang="ko-KR" dirty="0">
@@ -17466,154 +17534,13 @@
       </p:sp>
       <p:sp>
         <p:nvSpPr>
-          <p:cNvPr id="25" name="직사각형 24"/>
-          <p:cNvSpPr/>
-          <p:nvPr/>
-        </p:nvSpPr>
-        <p:spPr>
-          <a:xfrm>
-            <a:off x="3589712" y="5163535"/>
-            <a:ext cx="4089862" cy="462700"/>
-          </a:xfrm>
-          <a:prstGeom prst="rect">
-            <a:avLst/>
-          </a:prstGeom>
-          <a:solidFill>
-            <a:schemeClr val="bg1"/>
-          </a:solidFill>
-        </p:spPr>
-        <p:style>
-          <a:lnRef idx="2">
-            <a:schemeClr val="accent1">
-              <a:shade val="50000"/>
-            </a:schemeClr>
-          </a:lnRef>
-          <a:fillRef idx="1">
-            <a:schemeClr val="accent1"/>
-          </a:fillRef>
-          <a:effectRef idx="0">
-            <a:schemeClr val="accent1"/>
-          </a:effectRef>
-          <a:fontRef idx="minor">
-            <a:schemeClr val="lt1"/>
-          </a:fontRef>
-        </p:style>
-        <p:txBody>
-          <a:bodyPr rtlCol="0" anchor="ctr"/>
-          <a:lstStyle/>
-          <a:p>
-            <a:pPr algn="ctr"/>
-            <a:endParaRPr lang="ko-KR" altLang="en-US"/>
-          </a:p>
-        </p:txBody>
-      </p:sp>
-      <p:sp>
-        <p:nvSpPr>
-          <p:cNvPr id="26" name="직사각형 25"/>
-          <p:cNvSpPr/>
-          <p:nvPr/>
-        </p:nvSpPr>
-        <p:spPr>
-          <a:xfrm>
-            <a:off x="3589712" y="5656431"/>
-            <a:ext cx="4089862" cy="462700"/>
-          </a:xfrm>
-          <a:prstGeom prst="rect">
-            <a:avLst/>
-          </a:prstGeom>
-          <a:solidFill>
-            <a:schemeClr val="bg1"/>
-          </a:solidFill>
-        </p:spPr>
-        <p:style>
-          <a:lnRef idx="2">
-            <a:schemeClr val="accent1">
-              <a:shade val="50000"/>
-            </a:schemeClr>
-          </a:lnRef>
-          <a:fillRef idx="1">
-            <a:schemeClr val="accent1"/>
-          </a:fillRef>
-          <a:effectRef idx="0">
-            <a:schemeClr val="accent1"/>
-          </a:effectRef>
-          <a:fontRef idx="minor">
-            <a:schemeClr val="lt1"/>
-          </a:fontRef>
-        </p:style>
-        <p:txBody>
-          <a:bodyPr rtlCol="0" anchor="ctr"/>
-          <a:lstStyle/>
-          <a:p>
-            <a:pPr algn="ctr"/>
-            <a:endParaRPr lang="ko-KR" altLang="en-US"/>
-          </a:p>
-        </p:txBody>
-      </p:sp>
-      <p:sp>
-        <p:nvSpPr>
-          <p:cNvPr id="27" name="TextBox 26"/>
-          <p:cNvSpPr txBox="1"/>
-          <p:nvPr/>
-        </p:nvSpPr>
-        <p:spPr>
-          <a:xfrm>
-            <a:off x="3589712" y="5205113"/>
-            <a:ext cx="3767052" cy="369332"/>
-          </a:xfrm>
-          <a:prstGeom prst="rect">
-            <a:avLst/>
-          </a:prstGeom>
-          <a:noFill/>
-        </p:spPr>
-        <p:txBody>
-          <a:bodyPr wrap="square" rtlCol="0">
-            <a:spAutoFit/>
-          </a:bodyPr>
-          <a:lstStyle/>
-          <a:p>
-            <a:r>
-              <a:rPr lang="ko-KR" altLang="en-US" dirty="0">
-                <a:solidFill>
-                  <a:schemeClr val="tx1">
-                    <a:lumMod val="50000"/>
-                    <a:lumOff val="50000"/>
-                  </a:schemeClr>
-                </a:solidFill>
-              </a:rPr>
-              <a:t>사용하실 닉네임을 입력해 주세요</a:t>
-            </a:r>
-            <a:r>
-              <a:rPr lang="en-US" altLang="ko-KR" dirty="0">
-                <a:solidFill>
-                  <a:schemeClr val="tx1">
-                    <a:lumMod val="50000"/>
-                    <a:lumOff val="50000"/>
-                  </a:schemeClr>
-                </a:solidFill>
-              </a:rPr>
-              <a:t>.</a:t>
-            </a:r>
-            <a:endParaRPr lang="ko-KR" altLang="en-US" dirty="0">
-              <a:solidFill>
-                <a:schemeClr val="tx1">
-                  <a:lumMod val="50000"/>
-                  <a:lumOff val="50000"/>
-                </a:schemeClr>
-              </a:solidFill>
-            </a:endParaRPr>
-          </a:p>
-        </p:txBody>
-      </p:sp>
-      <p:sp>
-        <p:nvSpPr>
           <p:cNvPr id="28" name="TextBox 27"/>
           <p:cNvSpPr txBox="1"/>
           <p:nvPr/>
         </p:nvSpPr>
         <p:spPr>
           <a:xfrm>
-            <a:off x="3589712" y="5703115"/>
+            <a:off x="3564774" y="5393070"/>
             <a:ext cx="3767052" cy="369332"/>
           </a:xfrm>
           <a:prstGeom prst="rect">

</xml_diff>

<commit_message>
ADD : Store List
</commit_message>
<xml_diff>
--- a/202131205_김승진_실무게임프로그래밍_기획서.pptx
+++ b/202131205_김승진_실무게임프로그래밍_기획서.pptx
@@ -27,7 +27,6 @@
     <p:sldId id="275" r:id="rId21"/>
     <p:sldId id="282" r:id="rId22"/>
     <p:sldId id="283" r:id="rId23"/>
-    <p:sldId id="262" r:id="rId24"/>
   </p:sldIdLst>
   <p:sldSz cx="12192000" cy="6858000"/>
   <p:notesSz cx="6858000" cy="9144000"/>
@@ -263,7 +262,7 @@
           <a:p>
             <a:fld id="{16DB16CA-D4AF-495C-A36B-A16844DE5D9E}" type="datetimeFigureOut">
               <a:rPr lang="ko-KR" altLang="en-US" smtClean="0"/>
-              <a:t>2022-09-22</a:t>
+              <a:t>2022-09-23</a:t>
             </a:fld>
             <a:endParaRPr lang="ko-KR" altLang="en-US"/>
           </a:p>
@@ -431,7 +430,7 @@
           <a:p>
             <a:fld id="{16DB16CA-D4AF-495C-A36B-A16844DE5D9E}" type="datetimeFigureOut">
               <a:rPr lang="ko-KR" altLang="en-US" smtClean="0"/>
-              <a:t>2022-09-22</a:t>
+              <a:t>2022-09-23</a:t>
             </a:fld>
             <a:endParaRPr lang="ko-KR" altLang="en-US"/>
           </a:p>
@@ -609,7 +608,7 @@
           <a:p>
             <a:fld id="{16DB16CA-D4AF-495C-A36B-A16844DE5D9E}" type="datetimeFigureOut">
               <a:rPr lang="ko-KR" altLang="en-US" smtClean="0"/>
-              <a:t>2022-09-22</a:t>
+              <a:t>2022-09-23</a:t>
             </a:fld>
             <a:endParaRPr lang="ko-KR" altLang="en-US"/>
           </a:p>
@@ -777,7 +776,7 @@
           <a:p>
             <a:fld id="{16DB16CA-D4AF-495C-A36B-A16844DE5D9E}" type="datetimeFigureOut">
               <a:rPr lang="ko-KR" altLang="en-US" smtClean="0"/>
-              <a:t>2022-09-22</a:t>
+              <a:t>2022-09-23</a:t>
             </a:fld>
             <a:endParaRPr lang="ko-KR" altLang="en-US"/>
           </a:p>
@@ -1022,7 +1021,7 @@
           <a:p>
             <a:fld id="{16DB16CA-D4AF-495C-A36B-A16844DE5D9E}" type="datetimeFigureOut">
               <a:rPr lang="ko-KR" altLang="en-US" smtClean="0"/>
-              <a:t>2022-09-22</a:t>
+              <a:t>2022-09-23</a:t>
             </a:fld>
             <a:endParaRPr lang="ko-KR" altLang="en-US"/>
           </a:p>
@@ -1251,7 +1250,7 @@
           <a:p>
             <a:fld id="{16DB16CA-D4AF-495C-A36B-A16844DE5D9E}" type="datetimeFigureOut">
               <a:rPr lang="ko-KR" altLang="en-US" smtClean="0"/>
-              <a:t>2022-09-22</a:t>
+              <a:t>2022-09-23</a:t>
             </a:fld>
             <a:endParaRPr lang="ko-KR" altLang="en-US"/>
           </a:p>
@@ -1615,7 +1614,7 @@
           <a:p>
             <a:fld id="{16DB16CA-D4AF-495C-A36B-A16844DE5D9E}" type="datetimeFigureOut">
               <a:rPr lang="ko-KR" altLang="en-US" smtClean="0"/>
-              <a:t>2022-09-22</a:t>
+              <a:t>2022-09-23</a:t>
             </a:fld>
             <a:endParaRPr lang="ko-KR" altLang="en-US"/>
           </a:p>
@@ -1732,7 +1731,7 @@
           <a:p>
             <a:fld id="{16DB16CA-D4AF-495C-A36B-A16844DE5D9E}" type="datetimeFigureOut">
               <a:rPr lang="ko-KR" altLang="en-US" smtClean="0"/>
-              <a:t>2022-09-22</a:t>
+              <a:t>2022-09-23</a:t>
             </a:fld>
             <a:endParaRPr lang="ko-KR" altLang="en-US"/>
           </a:p>
@@ -1827,7 +1826,7 @@
           <a:p>
             <a:fld id="{16DB16CA-D4AF-495C-A36B-A16844DE5D9E}" type="datetimeFigureOut">
               <a:rPr lang="ko-KR" altLang="en-US" smtClean="0"/>
-              <a:t>2022-09-22</a:t>
+              <a:t>2022-09-23</a:t>
             </a:fld>
             <a:endParaRPr lang="ko-KR" altLang="en-US"/>
           </a:p>
@@ -2102,7 +2101,7 @@
           <a:p>
             <a:fld id="{16DB16CA-D4AF-495C-A36B-A16844DE5D9E}" type="datetimeFigureOut">
               <a:rPr lang="ko-KR" altLang="en-US" smtClean="0"/>
-              <a:t>2022-09-22</a:t>
+              <a:t>2022-09-23</a:t>
             </a:fld>
             <a:endParaRPr lang="ko-KR" altLang="en-US"/>
           </a:p>
@@ -2354,7 +2353,7 @@
           <a:p>
             <a:fld id="{16DB16CA-D4AF-495C-A36B-A16844DE5D9E}" type="datetimeFigureOut">
               <a:rPr lang="ko-KR" altLang="en-US" smtClean="0"/>
-              <a:t>2022-09-22</a:t>
+              <a:t>2022-09-23</a:t>
             </a:fld>
             <a:endParaRPr lang="ko-KR" altLang="en-US"/>
           </a:p>
@@ -2565,7 +2564,7 @@
           <a:p>
             <a:fld id="{16DB16CA-D4AF-495C-A36B-A16844DE5D9E}" type="datetimeFigureOut">
               <a:rPr lang="ko-KR" altLang="en-US" smtClean="0"/>
-              <a:t>2022-09-22</a:t>
+              <a:t>2022-09-23</a:t>
             </a:fld>
             <a:endParaRPr lang="ko-KR" altLang="en-US"/>
           </a:p>
@@ -7797,6 +7796,231 @@
           </a:p>
         </p:txBody>
       </p:sp>
+      <p:sp>
+        <p:nvSpPr>
+          <p:cNvPr id="34" name="모서리가 둥근 직사각형 33"/>
+          <p:cNvSpPr/>
+          <p:nvPr/>
+        </p:nvSpPr>
+        <p:spPr>
+          <a:xfrm>
+            <a:off x="4077627" y="6077808"/>
+            <a:ext cx="1221498" cy="379543"/>
+          </a:xfrm>
+          <a:prstGeom prst="roundRect">
+            <a:avLst/>
+          </a:prstGeom>
+          <a:solidFill>
+            <a:schemeClr val="bg2">
+              <a:lumMod val="90000"/>
+            </a:schemeClr>
+          </a:solidFill>
+        </p:spPr>
+        <p:style>
+          <a:lnRef idx="2">
+            <a:schemeClr val="accent1">
+              <a:shade val="50000"/>
+            </a:schemeClr>
+          </a:lnRef>
+          <a:fillRef idx="1">
+            <a:schemeClr val="accent1"/>
+          </a:fillRef>
+          <a:effectRef idx="0">
+            <a:schemeClr val="accent1"/>
+          </a:effectRef>
+          <a:fontRef idx="minor">
+            <a:schemeClr val="lt1"/>
+          </a:fontRef>
+        </p:style>
+        <p:txBody>
+          <a:bodyPr rtlCol="0" anchor="ctr"/>
+          <a:lstStyle/>
+          <a:p>
+            <a:pPr algn="ctr"/>
+            <a:endParaRPr lang="ko-KR" altLang="en-US"/>
+          </a:p>
+        </p:txBody>
+      </p:sp>
+      <p:sp>
+        <p:nvSpPr>
+          <p:cNvPr id="37" name="TextBox 36"/>
+          <p:cNvSpPr txBox="1"/>
+          <p:nvPr/>
+        </p:nvSpPr>
+        <p:spPr>
+          <a:xfrm>
+            <a:off x="4042754" y="6125333"/>
+            <a:ext cx="1368831" cy="276999"/>
+          </a:xfrm>
+          <a:prstGeom prst="rect">
+            <a:avLst/>
+          </a:prstGeom>
+          <a:noFill/>
+        </p:spPr>
+        <p:txBody>
+          <a:bodyPr wrap="square" rtlCol="0">
+            <a:spAutoFit/>
+          </a:bodyPr>
+          <a:lstStyle/>
+          <a:p>
+            <a:r>
+              <a:rPr lang="ko-KR" altLang="en-US" sz="1200" b="1" dirty="0" smtClean="0"/>
+              <a:t>장바구니에 추가</a:t>
+            </a:r>
+            <a:endParaRPr lang="ko-KR" altLang="en-US" sz="1200" b="1" dirty="0"/>
+          </a:p>
+        </p:txBody>
+      </p:sp>
+      <p:sp>
+        <p:nvSpPr>
+          <p:cNvPr id="43" name="모서리가 둥근 직사각형 42"/>
+          <p:cNvSpPr/>
+          <p:nvPr/>
+        </p:nvSpPr>
+        <p:spPr>
+          <a:xfrm>
+            <a:off x="10191081" y="4300995"/>
+            <a:ext cx="1221498" cy="379543"/>
+          </a:xfrm>
+          <a:prstGeom prst="roundRect">
+            <a:avLst/>
+          </a:prstGeom>
+          <a:solidFill>
+            <a:schemeClr val="bg2">
+              <a:lumMod val="90000"/>
+            </a:schemeClr>
+          </a:solidFill>
+        </p:spPr>
+        <p:style>
+          <a:lnRef idx="2">
+            <a:schemeClr val="accent1">
+              <a:shade val="50000"/>
+            </a:schemeClr>
+          </a:lnRef>
+          <a:fillRef idx="1">
+            <a:schemeClr val="accent1"/>
+          </a:fillRef>
+          <a:effectRef idx="0">
+            <a:schemeClr val="accent1"/>
+          </a:effectRef>
+          <a:fontRef idx="minor">
+            <a:schemeClr val="lt1"/>
+          </a:fontRef>
+        </p:style>
+        <p:txBody>
+          <a:bodyPr rtlCol="0" anchor="ctr"/>
+          <a:lstStyle/>
+          <a:p>
+            <a:pPr algn="ctr"/>
+            <a:endParaRPr lang="ko-KR" altLang="en-US"/>
+          </a:p>
+        </p:txBody>
+      </p:sp>
+      <p:sp>
+        <p:nvSpPr>
+          <p:cNvPr id="45" name="모서리가 둥근 직사각형 44"/>
+          <p:cNvSpPr/>
+          <p:nvPr/>
+        </p:nvSpPr>
+        <p:spPr>
+          <a:xfrm>
+            <a:off x="10191081" y="6074062"/>
+            <a:ext cx="1221498" cy="379543"/>
+          </a:xfrm>
+          <a:prstGeom prst="roundRect">
+            <a:avLst/>
+          </a:prstGeom>
+          <a:solidFill>
+            <a:schemeClr val="bg2">
+              <a:lumMod val="90000"/>
+            </a:schemeClr>
+          </a:solidFill>
+        </p:spPr>
+        <p:style>
+          <a:lnRef idx="2">
+            <a:schemeClr val="accent1">
+              <a:shade val="50000"/>
+            </a:schemeClr>
+          </a:lnRef>
+          <a:fillRef idx="1">
+            <a:schemeClr val="accent1"/>
+          </a:fillRef>
+          <a:effectRef idx="0">
+            <a:schemeClr val="accent1"/>
+          </a:effectRef>
+          <a:fontRef idx="minor">
+            <a:schemeClr val="lt1"/>
+          </a:fontRef>
+        </p:style>
+        <p:txBody>
+          <a:bodyPr rtlCol="0" anchor="ctr"/>
+          <a:lstStyle/>
+          <a:p>
+            <a:pPr algn="ctr"/>
+            <a:endParaRPr lang="ko-KR" altLang="en-US"/>
+          </a:p>
+        </p:txBody>
+      </p:sp>
+      <p:sp>
+        <p:nvSpPr>
+          <p:cNvPr id="50" name="TextBox 49"/>
+          <p:cNvSpPr txBox="1"/>
+          <p:nvPr/>
+        </p:nvSpPr>
+        <p:spPr>
+          <a:xfrm>
+            <a:off x="10150530" y="4352266"/>
+            <a:ext cx="1368831" cy="276999"/>
+          </a:xfrm>
+          <a:prstGeom prst="rect">
+            <a:avLst/>
+          </a:prstGeom>
+          <a:noFill/>
+        </p:spPr>
+        <p:txBody>
+          <a:bodyPr wrap="square" rtlCol="0">
+            <a:spAutoFit/>
+          </a:bodyPr>
+          <a:lstStyle/>
+          <a:p>
+            <a:r>
+              <a:rPr lang="ko-KR" altLang="en-US" sz="1200" b="1" dirty="0" smtClean="0"/>
+              <a:t>장바구니에 추가</a:t>
+            </a:r>
+            <a:endParaRPr lang="ko-KR" altLang="en-US" sz="1200" b="1" dirty="0"/>
+          </a:p>
+        </p:txBody>
+      </p:sp>
+      <p:sp>
+        <p:nvSpPr>
+          <p:cNvPr id="52" name="TextBox 51"/>
+          <p:cNvSpPr txBox="1"/>
+          <p:nvPr/>
+        </p:nvSpPr>
+        <p:spPr>
+          <a:xfrm>
+            <a:off x="10159695" y="6135008"/>
+            <a:ext cx="1368831" cy="276999"/>
+          </a:xfrm>
+          <a:prstGeom prst="rect">
+            <a:avLst/>
+          </a:prstGeom>
+          <a:noFill/>
+        </p:spPr>
+        <p:txBody>
+          <a:bodyPr wrap="square" rtlCol="0">
+            <a:spAutoFit/>
+          </a:bodyPr>
+          <a:lstStyle/>
+          <a:p>
+            <a:r>
+              <a:rPr lang="ko-KR" altLang="en-US" sz="1200" b="1" dirty="0" smtClean="0"/>
+              <a:t>장바구니에 추가</a:t>
+            </a:r>
+            <a:endParaRPr lang="ko-KR" altLang="en-US" sz="1200" b="1" dirty="0"/>
+          </a:p>
+        </p:txBody>
+      </p:sp>
     </p:spTree>
     <p:extLst>
       <p:ext uri="{BB962C8B-B14F-4D97-AF65-F5344CB8AC3E}">
@@ -7875,7 +8099,7 @@
         </p:nvSpPr>
         <p:spPr>
           <a:xfrm>
-            <a:off x="239683" y="1654251"/>
+            <a:off x="231371" y="1739566"/>
             <a:ext cx="11729258" cy="5067559"/>
           </a:xfrm>
           <a:prstGeom prst="rect">
@@ -8081,8 +8305,8 @@
         </p:nvSpPr>
         <p:spPr>
           <a:xfrm>
-            <a:off x="598517" y="3331060"/>
-            <a:ext cx="4813068" cy="1496291"/>
+            <a:off x="572885" y="3330374"/>
+            <a:ext cx="11179231" cy="3410562"/>
           </a:xfrm>
           <a:prstGeom prst="roundRect">
             <a:avLst/>
@@ -8118,550 +8342,100 @@
       </p:sp>
       <p:sp>
         <p:nvSpPr>
-          <p:cNvPr id="35" name="모서리가 둥근 직사각형 34"/>
-          <p:cNvSpPr/>
-          <p:nvPr/>
-        </p:nvSpPr>
-        <p:spPr>
-          <a:xfrm>
-            <a:off x="6702830" y="3331060"/>
-            <a:ext cx="4813068" cy="1496291"/>
-          </a:xfrm>
-          <a:prstGeom prst="roundRect">
-            <a:avLst/>
-          </a:prstGeom>
-          <a:solidFill>
-            <a:schemeClr val="bg1"/>
-          </a:solidFill>
-        </p:spPr>
-        <p:style>
-          <a:lnRef idx="2">
-            <a:schemeClr val="accent1">
-              <a:shade val="50000"/>
-            </a:schemeClr>
-          </a:lnRef>
-          <a:fillRef idx="1">
-            <a:schemeClr val="accent1"/>
-          </a:fillRef>
-          <a:effectRef idx="0">
-            <a:schemeClr val="accent1"/>
-          </a:effectRef>
-          <a:fontRef idx="minor">
-            <a:schemeClr val="lt1"/>
-          </a:fontRef>
-        </p:style>
-        <p:txBody>
-          <a:bodyPr rtlCol="0" anchor="ctr"/>
-          <a:lstStyle/>
-          <a:p>
-            <a:pPr algn="ctr"/>
-            <a:endParaRPr lang="ko-KR" altLang="en-US"/>
-          </a:p>
-        </p:txBody>
-      </p:sp>
-      <p:sp>
-        <p:nvSpPr>
-          <p:cNvPr id="36" name="모서리가 둥근 직사각형 35"/>
-          <p:cNvSpPr/>
-          <p:nvPr/>
-        </p:nvSpPr>
-        <p:spPr>
-          <a:xfrm>
-            <a:off x="6702830" y="5068652"/>
-            <a:ext cx="4813068" cy="1496291"/>
-          </a:xfrm>
-          <a:prstGeom prst="roundRect">
-            <a:avLst/>
-          </a:prstGeom>
-          <a:solidFill>
-            <a:schemeClr val="bg1"/>
-          </a:solidFill>
-        </p:spPr>
-        <p:style>
-          <a:lnRef idx="2">
-            <a:schemeClr val="accent1">
-              <a:shade val="50000"/>
-            </a:schemeClr>
-          </a:lnRef>
-          <a:fillRef idx="1">
-            <a:schemeClr val="accent1"/>
-          </a:fillRef>
-          <a:effectRef idx="0">
-            <a:schemeClr val="accent1"/>
-          </a:effectRef>
-          <a:fontRef idx="minor">
-            <a:schemeClr val="lt1"/>
-          </a:fontRef>
-        </p:style>
-        <p:txBody>
-          <a:bodyPr rtlCol="0" anchor="ctr"/>
-          <a:lstStyle/>
-          <a:p>
-            <a:pPr algn="ctr"/>
-            <a:endParaRPr lang="ko-KR" altLang="en-US"/>
-          </a:p>
-        </p:txBody>
-      </p:sp>
-      <p:sp>
-        <p:nvSpPr>
-          <p:cNvPr id="38" name="모서리가 둥근 직사각형 37"/>
-          <p:cNvSpPr/>
-          <p:nvPr/>
-        </p:nvSpPr>
-        <p:spPr>
-          <a:xfrm>
-            <a:off x="598517" y="5068651"/>
-            <a:ext cx="4813068" cy="1496291"/>
-          </a:xfrm>
-          <a:prstGeom prst="roundRect">
-            <a:avLst/>
-          </a:prstGeom>
-          <a:solidFill>
-            <a:schemeClr val="bg1"/>
-          </a:solidFill>
-        </p:spPr>
-        <p:style>
-          <a:lnRef idx="2">
-            <a:schemeClr val="accent1">
-              <a:shade val="50000"/>
-            </a:schemeClr>
-          </a:lnRef>
-          <a:fillRef idx="1">
-            <a:schemeClr val="accent1"/>
-          </a:fillRef>
-          <a:effectRef idx="0">
-            <a:schemeClr val="accent1"/>
-          </a:effectRef>
-          <a:fontRef idx="minor">
-            <a:schemeClr val="lt1"/>
-          </a:fontRef>
-        </p:style>
-        <p:txBody>
-          <a:bodyPr rtlCol="0" anchor="ctr"/>
-          <a:lstStyle/>
-          <a:p>
-            <a:pPr algn="ctr"/>
-            <a:endParaRPr lang="ko-KR" altLang="en-US"/>
-          </a:p>
-        </p:txBody>
-      </p:sp>
-      <p:sp>
-        <p:nvSpPr>
-          <p:cNvPr id="14" name="모서리가 둥근 직사각형 13"/>
-          <p:cNvSpPr/>
-          <p:nvPr/>
-        </p:nvSpPr>
-        <p:spPr>
-          <a:xfrm>
-            <a:off x="768925" y="3497314"/>
-            <a:ext cx="1216433" cy="1163782"/>
-          </a:xfrm>
-          <a:prstGeom prst="roundRect">
-            <a:avLst/>
-          </a:prstGeom>
-          <a:solidFill>
-            <a:schemeClr val="bg1"/>
-          </a:solidFill>
-        </p:spPr>
-        <p:style>
-          <a:lnRef idx="2">
-            <a:schemeClr val="accent1">
-              <a:shade val="50000"/>
-            </a:schemeClr>
-          </a:lnRef>
-          <a:fillRef idx="1">
-            <a:schemeClr val="accent1"/>
-          </a:fillRef>
-          <a:effectRef idx="0">
-            <a:schemeClr val="accent1"/>
-          </a:effectRef>
-          <a:fontRef idx="minor">
-            <a:schemeClr val="lt1"/>
-          </a:fontRef>
-        </p:style>
-        <p:txBody>
-          <a:bodyPr rtlCol="0" anchor="ctr"/>
-          <a:lstStyle/>
-          <a:p>
-            <a:pPr algn="ctr"/>
-            <a:endParaRPr lang="ko-KR" altLang="en-US"/>
-          </a:p>
-        </p:txBody>
-      </p:sp>
-      <p:sp>
-        <p:nvSpPr>
-          <p:cNvPr id="39" name="모서리가 둥근 직사각형 38"/>
-          <p:cNvSpPr/>
-          <p:nvPr/>
-        </p:nvSpPr>
-        <p:spPr>
-          <a:xfrm>
-            <a:off x="768926" y="5234905"/>
-            <a:ext cx="1216433" cy="1163782"/>
-          </a:xfrm>
-          <a:prstGeom prst="roundRect">
-            <a:avLst/>
-          </a:prstGeom>
-          <a:solidFill>
-            <a:schemeClr val="bg1"/>
-          </a:solidFill>
-        </p:spPr>
-        <p:style>
-          <a:lnRef idx="2">
-            <a:schemeClr val="accent1">
-              <a:shade val="50000"/>
-            </a:schemeClr>
-          </a:lnRef>
-          <a:fillRef idx="1">
-            <a:schemeClr val="accent1"/>
-          </a:fillRef>
-          <a:effectRef idx="0">
-            <a:schemeClr val="accent1"/>
-          </a:effectRef>
-          <a:fontRef idx="minor">
-            <a:schemeClr val="lt1"/>
-          </a:fontRef>
-        </p:style>
-        <p:txBody>
-          <a:bodyPr rtlCol="0" anchor="ctr"/>
-          <a:lstStyle/>
-          <a:p>
-            <a:pPr algn="ctr"/>
-            <a:endParaRPr lang="ko-KR" altLang="en-US"/>
-          </a:p>
-        </p:txBody>
-      </p:sp>
-      <p:sp>
-        <p:nvSpPr>
-          <p:cNvPr id="40" name="모서리가 둥근 직사각형 39"/>
-          <p:cNvSpPr/>
-          <p:nvPr/>
-        </p:nvSpPr>
-        <p:spPr>
-          <a:xfrm>
-            <a:off x="6862155" y="3497314"/>
-            <a:ext cx="1216433" cy="1163782"/>
-          </a:xfrm>
-          <a:prstGeom prst="roundRect">
-            <a:avLst/>
-          </a:prstGeom>
-          <a:solidFill>
-            <a:schemeClr val="bg1"/>
-          </a:solidFill>
-        </p:spPr>
-        <p:style>
-          <a:lnRef idx="2">
-            <a:schemeClr val="accent1">
-              <a:shade val="50000"/>
-            </a:schemeClr>
-          </a:lnRef>
-          <a:fillRef idx="1">
-            <a:schemeClr val="accent1"/>
-          </a:fillRef>
-          <a:effectRef idx="0">
-            <a:schemeClr val="accent1"/>
-          </a:effectRef>
-          <a:fontRef idx="minor">
-            <a:schemeClr val="lt1"/>
-          </a:fontRef>
-        </p:style>
-        <p:txBody>
-          <a:bodyPr rtlCol="0" anchor="ctr"/>
-          <a:lstStyle/>
-          <a:p>
-            <a:pPr algn="ctr"/>
-            <a:endParaRPr lang="ko-KR" altLang="en-US"/>
-          </a:p>
-        </p:txBody>
-      </p:sp>
-      <p:sp>
-        <p:nvSpPr>
-          <p:cNvPr id="41" name="모서리가 둥근 직사각형 40"/>
-          <p:cNvSpPr/>
-          <p:nvPr/>
-        </p:nvSpPr>
-        <p:spPr>
-          <a:xfrm>
-            <a:off x="6862154" y="5248225"/>
-            <a:ext cx="1216433" cy="1163782"/>
-          </a:xfrm>
-          <a:prstGeom prst="roundRect">
-            <a:avLst/>
-          </a:prstGeom>
-          <a:solidFill>
-            <a:schemeClr val="bg1"/>
-          </a:solidFill>
-        </p:spPr>
-        <p:style>
-          <a:lnRef idx="2">
-            <a:schemeClr val="accent1">
-              <a:shade val="50000"/>
-            </a:schemeClr>
-          </a:lnRef>
-          <a:fillRef idx="1">
-            <a:schemeClr val="accent1"/>
-          </a:fillRef>
-          <a:effectRef idx="0">
-            <a:schemeClr val="accent1"/>
-          </a:effectRef>
-          <a:fontRef idx="minor">
-            <a:schemeClr val="lt1"/>
-          </a:fontRef>
-        </p:style>
-        <p:txBody>
-          <a:bodyPr rtlCol="0" anchor="ctr"/>
-          <a:lstStyle/>
-          <a:p>
-            <a:pPr algn="ctr"/>
-            <a:endParaRPr lang="ko-KR" altLang="en-US"/>
-          </a:p>
-        </p:txBody>
-      </p:sp>
-      <p:sp>
-        <p:nvSpPr>
           <p:cNvPr id="44" name="TextBox 43"/>
           <p:cNvSpPr txBox="1"/>
           <p:nvPr/>
         </p:nvSpPr>
         <p:spPr>
           <a:xfrm>
-            <a:off x="2022767" y="3495021"/>
-            <a:ext cx="1632070" cy="338554"/>
-          </a:xfrm>
-          <a:prstGeom prst="rect">
-            <a:avLst/>
-          </a:prstGeom>
-          <a:noFill/>
-        </p:spPr>
-        <p:txBody>
-          <a:bodyPr wrap="square" rtlCol="0">
-            <a:spAutoFit/>
-          </a:bodyPr>
-          <a:lstStyle/>
-          <a:p>
+            <a:off x="908860" y="3542403"/>
+            <a:ext cx="8235140" cy="830997"/>
+          </a:xfrm>
+          <a:prstGeom prst="rect">
+            <a:avLst/>
+          </a:prstGeom>
+          <a:noFill/>
+        </p:spPr>
+        <p:txBody>
+          <a:bodyPr wrap="square" rtlCol="0">
+            <a:spAutoFit/>
+          </a:bodyPr>
+          <a:lstStyle/>
+          <a:p>
+            <a:r>
+              <a:rPr lang="en-US" altLang="ko-KR" sz="1600" b="1" dirty="0" smtClean="0"/>
+              <a:t>100% </a:t>
+            </a:r>
+            <a:r>
+              <a:rPr lang="ko-KR" altLang="en-US" sz="1600" b="1" dirty="0" smtClean="0"/>
+              <a:t>국내산만 사용하는 도미노 피자입니다</a:t>
+            </a:r>
+            <a:r>
+              <a:rPr lang="en-US" altLang="ko-KR" sz="1600" b="1" dirty="0" smtClean="0"/>
+              <a:t>. </a:t>
+            </a:r>
+            <a:r>
+              <a:rPr lang="ko-KR" altLang="en-US" sz="1600" b="1" dirty="0" smtClean="0"/>
+              <a:t>찾아주셔서 감사합니다</a:t>
+            </a:r>
+            <a:r>
+              <a:rPr lang="en-US" altLang="ko-KR" sz="1600" b="1" dirty="0" smtClean="0"/>
+              <a:t>.</a:t>
+            </a:r>
+          </a:p>
+          <a:p>
+            <a:r>
+              <a:rPr lang="en-US" altLang="ko-KR" sz="1600" b="1" dirty="0"/>
+              <a:t>100% </a:t>
+            </a:r>
             <a:r>
               <a:rPr lang="ko-KR" altLang="en-US" sz="1600" b="1" dirty="0"/>
-              <a:t>고구마 피자</a:t>
-            </a:r>
-          </a:p>
-        </p:txBody>
-      </p:sp>
-      <p:sp>
-        <p:nvSpPr>
-          <p:cNvPr id="46" name="TextBox 45"/>
-          <p:cNvSpPr txBox="1"/>
-          <p:nvPr/>
-        </p:nvSpPr>
-        <p:spPr>
-          <a:xfrm>
-            <a:off x="2022767" y="5275276"/>
-            <a:ext cx="1632070" cy="338554"/>
-          </a:xfrm>
-          <a:prstGeom prst="rect">
-            <a:avLst/>
-          </a:prstGeom>
-          <a:noFill/>
-        </p:spPr>
-        <p:txBody>
-          <a:bodyPr wrap="square" rtlCol="0">
-            <a:spAutoFit/>
-          </a:bodyPr>
-          <a:lstStyle/>
-          <a:p>
+              <a:t>국내산만 사용하는 도미노 피자입니다</a:t>
+            </a:r>
+            <a:r>
+              <a:rPr lang="en-US" altLang="ko-KR" sz="1600" b="1" dirty="0"/>
+              <a:t>. </a:t>
+            </a:r>
             <a:r>
               <a:rPr lang="ko-KR" altLang="en-US" sz="1600" b="1" dirty="0"/>
-              <a:t>불고기 피자</a:t>
-            </a:r>
-          </a:p>
-        </p:txBody>
-      </p:sp>
-      <p:sp>
-        <p:nvSpPr>
-          <p:cNvPr id="47" name="TextBox 46"/>
-          <p:cNvSpPr txBox="1"/>
-          <p:nvPr/>
-        </p:nvSpPr>
-        <p:spPr>
-          <a:xfrm>
-            <a:off x="8085514" y="3519421"/>
-            <a:ext cx="1632070" cy="338554"/>
-          </a:xfrm>
-          <a:prstGeom prst="rect">
-            <a:avLst/>
-          </a:prstGeom>
-          <a:noFill/>
-        </p:spPr>
-        <p:txBody>
-          <a:bodyPr wrap="square" rtlCol="0">
-            <a:spAutoFit/>
-          </a:bodyPr>
-          <a:lstStyle/>
-          <a:p>
+              <a:t>찾아주셔서 </a:t>
+            </a:r>
+            <a:r>
+              <a:rPr lang="ko-KR" altLang="en-US" sz="1600" b="1" dirty="0" smtClean="0"/>
+              <a:t>감사합니다</a:t>
+            </a:r>
+            <a:r>
+              <a:rPr lang="en-US" altLang="ko-KR" sz="1600" b="1" dirty="0" smtClean="0"/>
+              <a:t>.</a:t>
+            </a:r>
+            <a:endParaRPr lang="en-US" altLang="ko-KR" sz="1600" b="1" dirty="0" smtClean="0"/>
+          </a:p>
+          <a:p>
+            <a:r>
+              <a:rPr lang="en-US" altLang="ko-KR" sz="1600" b="1" dirty="0"/>
+              <a:t>100% </a:t>
+            </a:r>
             <a:r>
               <a:rPr lang="ko-KR" altLang="en-US" sz="1600" b="1" dirty="0"/>
-              <a:t>치즈 피자</a:t>
-            </a:r>
-          </a:p>
-        </p:txBody>
-      </p:sp>
-      <p:sp>
-        <p:nvSpPr>
-          <p:cNvPr id="48" name="TextBox 47"/>
-          <p:cNvSpPr txBox="1"/>
-          <p:nvPr/>
-        </p:nvSpPr>
-        <p:spPr>
-          <a:xfrm>
-            <a:off x="8085516" y="5275276"/>
-            <a:ext cx="1632070" cy="338554"/>
-          </a:xfrm>
-          <a:prstGeom prst="rect">
-            <a:avLst/>
-          </a:prstGeom>
-          <a:noFill/>
-        </p:spPr>
-        <p:txBody>
-          <a:bodyPr wrap="square" rtlCol="0">
-            <a:spAutoFit/>
-          </a:bodyPr>
-          <a:lstStyle/>
-          <a:p>
+              <a:t>국내산만 사용하는 도미노 피자입니다</a:t>
+            </a:r>
+            <a:r>
+              <a:rPr lang="en-US" altLang="ko-KR" sz="1600" b="1" dirty="0"/>
+              <a:t>. </a:t>
+            </a:r>
             <a:r>
               <a:rPr lang="ko-KR" altLang="en-US" sz="1600" b="1" dirty="0"/>
-              <a:t>새우 피자</a:t>
-            </a:r>
-          </a:p>
-        </p:txBody>
-      </p:sp>
-      <p:sp>
-        <p:nvSpPr>
-          <p:cNvPr id="49" name="TextBox 48"/>
-          <p:cNvSpPr txBox="1"/>
-          <p:nvPr/>
-        </p:nvSpPr>
-        <p:spPr>
-          <a:xfrm>
-            <a:off x="2022767" y="3833575"/>
-            <a:ext cx="2823553" cy="261610"/>
-          </a:xfrm>
-          <a:prstGeom prst="rect">
-            <a:avLst/>
-          </a:prstGeom>
-          <a:noFill/>
-        </p:spPr>
-        <p:txBody>
-          <a:bodyPr wrap="square" rtlCol="0">
-            <a:spAutoFit/>
-          </a:bodyPr>
-          <a:lstStyle/>
-          <a:p>
-            <a:r>
-              <a:rPr lang="en-US" altLang="ko-KR" sz="1100" b="1" dirty="0"/>
-              <a:t>10,000</a:t>
-            </a:r>
-            <a:r>
-              <a:rPr lang="ko-KR" altLang="en-US" sz="1100" b="1" dirty="0"/>
-              <a:t>원</a:t>
-            </a:r>
-          </a:p>
-        </p:txBody>
-      </p:sp>
-      <p:sp>
-        <p:nvSpPr>
-          <p:cNvPr id="51" name="TextBox 50"/>
-          <p:cNvSpPr txBox="1"/>
-          <p:nvPr/>
-        </p:nvSpPr>
-        <p:spPr>
-          <a:xfrm>
-            <a:off x="2022765" y="5613830"/>
-            <a:ext cx="2823553" cy="261610"/>
-          </a:xfrm>
-          <a:prstGeom prst="rect">
-            <a:avLst/>
-          </a:prstGeom>
-          <a:noFill/>
-        </p:spPr>
-        <p:txBody>
-          <a:bodyPr wrap="square" rtlCol="0">
-            <a:spAutoFit/>
-          </a:bodyPr>
-          <a:lstStyle/>
-          <a:p>
-            <a:r>
-              <a:rPr lang="en-US" altLang="ko-KR" sz="1100" b="1" dirty="0"/>
-              <a:t>11,000</a:t>
-            </a:r>
-            <a:r>
-              <a:rPr lang="ko-KR" altLang="en-US" sz="1100" b="1" dirty="0"/>
-              <a:t>원</a:t>
-            </a:r>
-          </a:p>
-        </p:txBody>
-      </p:sp>
-      <p:sp>
-        <p:nvSpPr>
-          <p:cNvPr id="53" name="TextBox 52"/>
-          <p:cNvSpPr txBox="1"/>
-          <p:nvPr/>
-        </p:nvSpPr>
-        <p:spPr>
-          <a:xfrm>
-            <a:off x="8085517" y="3833575"/>
-            <a:ext cx="2823553" cy="261610"/>
-          </a:xfrm>
-          <a:prstGeom prst="rect">
-            <a:avLst/>
-          </a:prstGeom>
-          <a:noFill/>
-        </p:spPr>
-        <p:txBody>
-          <a:bodyPr wrap="square" rtlCol="0">
-            <a:spAutoFit/>
-          </a:bodyPr>
-          <a:lstStyle/>
-          <a:p>
-            <a:r>
-              <a:rPr lang="en-US" altLang="ko-KR" sz="1100" b="1" dirty="0"/>
-              <a:t>3,000</a:t>
-            </a:r>
-            <a:r>
-              <a:rPr lang="ko-KR" altLang="en-US" sz="1100" b="1" dirty="0"/>
-              <a:t>원</a:t>
-            </a:r>
-          </a:p>
-        </p:txBody>
-      </p:sp>
-      <p:sp>
-        <p:nvSpPr>
-          <p:cNvPr id="55" name="TextBox 54"/>
-          <p:cNvSpPr txBox="1"/>
-          <p:nvPr/>
-        </p:nvSpPr>
-        <p:spPr>
-          <a:xfrm>
-            <a:off x="8085515" y="5606642"/>
-            <a:ext cx="2823553" cy="261610"/>
-          </a:xfrm>
-          <a:prstGeom prst="rect">
-            <a:avLst/>
-          </a:prstGeom>
-          <a:noFill/>
-        </p:spPr>
-        <p:txBody>
-          <a:bodyPr wrap="square" rtlCol="0">
-            <a:spAutoFit/>
-          </a:bodyPr>
-          <a:lstStyle/>
-          <a:p>
-            <a:r>
-              <a:rPr lang="en-US" altLang="ko-KR" sz="1100" b="1" dirty="0"/>
-              <a:t>13,000</a:t>
-            </a:r>
-            <a:r>
-              <a:rPr lang="ko-KR" altLang="en-US" sz="1100" b="1" dirty="0"/>
-              <a:t>원</a:t>
-            </a:r>
+              <a:t>찾아주셔서 </a:t>
+            </a:r>
+            <a:r>
+              <a:rPr lang="ko-KR" altLang="en-US" sz="1600" b="1" dirty="0" smtClean="0"/>
+              <a:t>감사합니다</a:t>
+            </a:r>
+            <a:r>
+              <a:rPr lang="en-US" altLang="ko-KR" sz="1600" b="1" dirty="0" smtClean="0"/>
+              <a:t>.</a:t>
+            </a:r>
+            <a:endParaRPr lang="ko-KR" altLang="en-US" sz="1600" b="1" dirty="0"/>
           </a:p>
         </p:txBody>
       </p:sp>
@@ -8914,6 +8688,196 @@
               <a:rPr lang="ko-KR" altLang="en-US" b="1" dirty="0"/>
               <a:t>리뷰</a:t>
             </a:r>
+          </a:p>
+        </p:txBody>
+      </p:sp>
+      <p:cxnSp>
+        <p:nvCxnSpPr>
+          <p:cNvPr id="16" name="직선 연결선 15"/>
+          <p:cNvCxnSpPr/>
+          <p:nvPr/>
+        </p:nvCxnSpPr>
+        <p:spPr>
+          <a:xfrm flipV="1">
+            <a:off x="673331" y="4838007"/>
+            <a:ext cx="11014364" cy="8313"/>
+          </a:xfrm>
+          <a:prstGeom prst="line">
+            <a:avLst/>
+          </a:prstGeom>
+        </p:spPr>
+        <p:style>
+          <a:lnRef idx="1">
+            <a:schemeClr val="accent1"/>
+          </a:lnRef>
+          <a:fillRef idx="0">
+            <a:schemeClr val="accent1"/>
+          </a:fillRef>
+          <a:effectRef idx="0">
+            <a:schemeClr val="accent1"/>
+          </a:effectRef>
+          <a:fontRef idx="minor">
+            <a:schemeClr val="tx1"/>
+          </a:fontRef>
+        </p:style>
+      </p:cxnSp>
+      <p:sp>
+        <p:nvSpPr>
+          <p:cNvPr id="17" name="TextBox 16"/>
+          <p:cNvSpPr txBox="1"/>
+          <p:nvPr/>
+        </p:nvSpPr>
+        <p:spPr>
+          <a:xfrm>
+            <a:off x="846511" y="5076313"/>
+            <a:ext cx="1880063" cy="338554"/>
+          </a:xfrm>
+          <a:prstGeom prst="rect">
+            <a:avLst/>
+          </a:prstGeom>
+          <a:noFill/>
+        </p:spPr>
+        <p:txBody>
+          <a:bodyPr wrap="square" rtlCol="0">
+            <a:spAutoFit/>
+          </a:bodyPr>
+          <a:lstStyle/>
+          <a:p>
+            <a:r>
+              <a:rPr lang="ko-KR" altLang="en-US" sz="1600" b="1" dirty="0" err="1" smtClean="0"/>
+              <a:t>배달팁</a:t>
+            </a:r>
+            <a:r>
+              <a:rPr lang="ko-KR" altLang="en-US" sz="1600" b="1" dirty="0" smtClean="0"/>
+              <a:t> </a:t>
+            </a:r>
+            <a:r>
+              <a:rPr lang="en-US" altLang="ko-KR" sz="1600" b="1" dirty="0" smtClean="0"/>
+              <a:t>: 3,000</a:t>
+            </a:r>
+            <a:r>
+              <a:rPr lang="ko-KR" altLang="en-US" sz="1600" b="1" dirty="0" smtClean="0"/>
+              <a:t>원</a:t>
+            </a:r>
+            <a:endParaRPr lang="ko-KR" altLang="en-US" sz="1600" b="1" dirty="0"/>
+          </a:p>
+        </p:txBody>
+      </p:sp>
+      <p:sp>
+        <p:nvSpPr>
+          <p:cNvPr id="37" name="TextBox 36"/>
+          <p:cNvSpPr txBox="1"/>
+          <p:nvPr/>
+        </p:nvSpPr>
+        <p:spPr>
+          <a:xfrm>
+            <a:off x="846510" y="5507412"/>
+            <a:ext cx="2902530" cy="338554"/>
+          </a:xfrm>
+          <a:prstGeom prst="rect">
+            <a:avLst/>
+          </a:prstGeom>
+          <a:noFill/>
+        </p:spPr>
+        <p:txBody>
+          <a:bodyPr wrap="square" rtlCol="0">
+            <a:spAutoFit/>
+          </a:bodyPr>
+          <a:lstStyle/>
+          <a:p>
+            <a:r>
+              <a:rPr lang="ko-KR" altLang="en-US" sz="1600" b="1" dirty="0" smtClean="0"/>
+              <a:t>최소주문금액 </a:t>
+            </a:r>
+            <a:r>
+              <a:rPr lang="en-US" altLang="ko-KR" sz="1600" b="1" dirty="0" smtClean="0"/>
+              <a:t>: 3,000</a:t>
+            </a:r>
+            <a:r>
+              <a:rPr lang="ko-KR" altLang="en-US" sz="1600" b="1" dirty="0" smtClean="0"/>
+              <a:t>원</a:t>
+            </a:r>
+            <a:endParaRPr lang="ko-KR" altLang="en-US" sz="1600" b="1" dirty="0"/>
+          </a:p>
+        </p:txBody>
+      </p:sp>
+      <p:sp>
+        <p:nvSpPr>
+          <p:cNvPr id="42" name="TextBox 41"/>
+          <p:cNvSpPr txBox="1"/>
+          <p:nvPr/>
+        </p:nvSpPr>
+        <p:spPr>
+          <a:xfrm>
+            <a:off x="7909561" y="5455074"/>
+            <a:ext cx="2902530" cy="338554"/>
+          </a:xfrm>
+          <a:prstGeom prst="rect">
+            <a:avLst/>
+          </a:prstGeom>
+          <a:noFill/>
+        </p:spPr>
+        <p:txBody>
+          <a:bodyPr wrap="square" rtlCol="0">
+            <a:spAutoFit/>
+          </a:bodyPr>
+          <a:lstStyle/>
+          <a:p>
+            <a:r>
+              <a:rPr lang="ko-KR" altLang="en-US" sz="1600" b="1" dirty="0" err="1" smtClean="0"/>
+              <a:t>배달시간</a:t>
+            </a:r>
+            <a:r>
+              <a:rPr lang="ko-KR" altLang="en-US" sz="1600" b="1" dirty="0" smtClean="0"/>
+              <a:t> </a:t>
+            </a:r>
+            <a:r>
+              <a:rPr lang="en-US" altLang="ko-KR" sz="1600" b="1" dirty="0" smtClean="0"/>
+              <a:t>: 30</a:t>
+            </a:r>
+            <a:r>
+              <a:rPr lang="ko-KR" altLang="en-US" sz="1600" b="1" dirty="0" smtClean="0"/>
+              <a:t>분</a:t>
+            </a:r>
+            <a:endParaRPr lang="ko-KR" altLang="en-US" sz="1600" b="1" dirty="0"/>
+          </a:p>
+        </p:txBody>
+      </p:sp>
+      <p:sp>
+        <p:nvSpPr>
+          <p:cNvPr id="43" name="TextBox 42"/>
+          <p:cNvSpPr txBox="1"/>
+          <p:nvPr/>
+        </p:nvSpPr>
+        <p:spPr>
+          <a:xfrm>
+            <a:off x="7909561" y="5076313"/>
+            <a:ext cx="3452551" cy="338554"/>
+          </a:xfrm>
+          <a:prstGeom prst="rect">
+            <a:avLst/>
+          </a:prstGeom>
+          <a:noFill/>
+        </p:spPr>
+        <p:txBody>
+          <a:bodyPr wrap="square" rtlCol="0">
+            <a:spAutoFit/>
+          </a:bodyPr>
+          <a:lstStyle/>
+          <a:p>
+            <a:r>
+              <a:rPr lang="ko-KR" altLang="en-US" sz="1600" b="1" dirty="0" smtClean="0"/>
+              <a:t>매장 전화번호 </a:t>
+            </a:r>
+            <a:r>
+              <a:rPr lang="en-US" altLang="ko-KR" sz="1600" b="1" dirty="0"/>
+              <a:t>:</a:t>
+            </a:r>
+            <a:r>
+              <a:rPr lang="en-US" altLang="ko-KR" sz="1600" b="1" dirty="0" smtClean="0"/>
+              <a:t> 010 – 1234 - 5678 </a:t>
+            </a:r>
+            <a:endParaRPr lang="ko-KR" altLang="en-US" sz="1600" b="1" dirty="0"/>
           </a:p>
         </p:txBody>
       </p:sp>
@@ -10825,11 +10789,7 @@
           <a:p>
             <a:r>
               <a:rPr lang="ko-KR" altLang="en-US" b="1" dirty="0" smtClean="0"/>
-              <a:t>만료</a:t>
-            </a:r>
-            <a:r>
-              <a:rPr lang="ko-KR" altLang="en-US" b="1" dirty="0" smtClean="0"/>
-              <a:t>일</a:t>
+              <a:t>만료일</a:t>
             </a:r>
             <a:endParaRPr lang="ko-KR" altLang="en-US" b="1" dirty="0"/>
           </a:p>
@@ -11366,11 +11326,7 @@
           <a:p>
             <a:r>
               <a:rPr lang="en-US" altLang="ko-KR" b="1" dirty="0" smtClean="0"/>
-              <a:t>10,</a:t>
-            </a:r>
-            <a:r>
-              <a:rPr lang="en-US" altLang="ko-KR" b="1" dirty="0" smtClean="0"/>
-              <a:t>000</a:t>
+              <a:t>10,000</a:t>
             </a:r>
             <a:r>
               <a:rPr lang="ko-KR" altLang="en-US" b="1" dirty="0" smtClean="0"/>
@@ -13511,7 +13467,6 @@
               <a:rPr lang="ko-KR" altLang="en-US" dirty="0"/>
               <a:t>기</a:t>
             </a:r>
-            <a:endParaRPr lang="ko-KR" altLang="en-US" dirty="0"/>
           </a:p>
         </p:txBody>
       </p:sp>
@@ -15158,11 +15113,7 @@
           <a:p>
             <a:r>
               <a:rPr lang="ko-KR" altLang="en-US" b="1" dirty="0" smtClean="0"/>
-              <a:t>주문하신  </a:t>
-            </a:r>
-            <a:r>
-              <a:rPr lang="ko-KR" altLang="en-US" b="1" dirty="0" smtClean="0"/>
-              <a:t>메뉴</a:t>
+              <a:t>주문하신  메뉴</a:t>
             </a:r>
             <a:endParaRPr lang="ko-KR" altLang="en-US" b="1" dirty="0"/>
           </a:p>
@@ -16471,11 +16422,7 @@
           <a:p>
             <a:r>
               <a:rPr lang="en-US" altLang="ko-KR" b="1" dirty="0" smtClean="0"/>
-              <a:t>10,</a:t>
-            </a:r>
-            <a:r>
-              <a:rPr lang="en-US" altLang="ko-KR" b="1" dirty="0" smtClean="0"/>
-              <a:t>000</a:t>
+              <a:t>10,000</a:t>
             </a:r>
             <a:r>
               <a:rPr lang="ko-KR" altLang="en-US" b="1" dirty="0" smtClean="0"/>
@@ -16639,74 +16586,6 @@
     <p:extLst>
       <p:ext uri="{BB962C8B-B14F-4D97-AF65-F5344CB8AC3E}">
         <p14:creationId xmlns:p14="http://schemas.microsoft.com/office/powerpoint/2010/main" val="296269224"/>
-      </p:ext>
-    </p:extLst>
-  </p:cSld>
-  <p:clrMapOvr>
-    <a:masterClrMapping/>
-  </p:clrMapOvr>
-</p:sld>
-</file>
-
-<file path=ppt/slides/slide23.xml><?xml version="1.0" encoding="utf-8"?>
-<p:sld xmlns:a="http://schemas.openxmlformats.org/drawingml/2006/main" xmlns:r="http://schemas.openxmlformats.org/officeDocument/2006/relationships" xmlns:p="http://schemas.openxmlformats.org/presentationml/2006/main">
-  <p:cSld>
-    <p:spTree>
-      <p:nvGrpSpPr>
-        <p:cNvPr id="1" name=""/>
-        <p:cNvGrpSpPr/>
-        <p:nvPr/>
-      </p:nvGrpSpPr>
-      <p:grpSpPr>
-        <a:xfrm>
-          <a:off x="0" y="0"/>
-          <a:ext cx="0" cy="0"/>
-          <a:chOff x="0" y="0"/>
-          <a:chExt cx="0" cy="0"/>
-        </a:xfrm>
-      </p:grpSpPr>
-      <p:sp>
-        <p:nvSpPr>
-          <p:cNvPr id="2" name="제목 1"/>
-          <p:cNvSpPr>
-            <a:spLocks noGrp="1"/>
-          </p:cNvSpPr>
-          <p:nvPr>
-            <p:ph type="title"/>
-          </p:nvPr>
-        </p:nvSpPr>
-        <p:spPr/>
-        <p:txBody>
-          <a:bodyPr/>
-          <a:lstStyle/>
-          <a:p>
-            <a:endParaRPr lang="ko-KR" altLang="en-US"/>
-          </a:p>
-        </p:txBody>
-      </p:sp>
-      <p:sp>
-        <p:nvSpPr>
-          <p:cNvPr id="3" name="내용 개체 틀 2"/>
-          <p:cNvSpPr>
-            <a:spLocks noGrp="1"/>
-          </p:cNvSpPr>
-          <p:nvPr>
-            <p:ph idx="1"/>
-          </p:nvPr>
-        </p:nvSpPr>
-        <p:spPr/>
-        <p:txBody>
-          <a:bodyPr/>
-          <a:lstStyle/>
-          <a:p>
-            <a:endParaRPr lang="ko-KR" altLang="en-US" dirty="0"/>
-          </a:p>
-        </p:txBody>
-      </p:sp>
-    </p:spTree>
-    <p:extLst>
-      <p:ext uri="{BB962C8B-B14F-4D97-AF65-F5344CB8AC3E}">
-        <p14:creationId xmlns:p14="http://schemas.microsoft.com/office/powerpoint/2010/main" val="2148206755"/>
       </p:ext>
     </p:extLst>
   </p:cSld>
@@ -18320,11 +18199,7 @@
           <a:p>
             <a:r>
               <a:rPr lang="ko-KR" altLang="en-US" sz="1200" dirty="0" smtClean="0"/>
-              <a:t>회원가입</a:t>
-            </a:r>
-            <a:r>
-              <a:rPr lang="ko-KR" altLang="en-US" sz="1200" dirty="0" smtClean="0"/>
-              <a:t> </a:t>
+              <a:t>회원가입 </a:t>
             </a:r>
             <a:r>
               <a:rPr lang="ko-KR" altLang="en-US" sz="1200" dirty="0"/>
@@ -18818,11 +18693,7 @@
           <a:p>
             <a:r>
               <a:rPr lang="ko-KR" altLang="en-US" sz="1400" dirty="0" smtClean="0"/>
-              <a:t>회원가입</a:t>
-            </a:r>
-            <a:r>
-              <a:rPr lang="ko-KR" altLang="en-US" sz="1400" dirty="0" smtClean="0"/>
-              <a:t> </a:t>
+              <a:t>회원가입 </a:t>
             </a:r>
             <a:r>
               <a:rPr lang="en-US" altLang="ko-KR" sz="1400" dirty="0"/>
@@ -21710,11 +21581,7 @@
           <a:p>
             <a:r>
               <a:rPr lang="ko-KR" altLang="en-US" sz="1100" dirty="0" smtClean="0"/>
-              <a:t>주문</a:t>
-            </a:r>
-            <a:r>
-              <a:rPr lang="ko-KR" altLang="en-US" sz="1100" dirty="0" smtClean="0"/>
-              <a:t> 정보 제공</a:t>
+              <a:t>주문 정보 제공</a:t>
             </a:r>
             <a:endParaRPr lang="ko-KR" altLang="en-US" sz="1100" dirty="0"/>
           </a:p>
@@ -22059,11 +21926,7 @@
             </a:r>
             <a:r>
               <a:rPr lang="ko-KR" altLang="en-US" sz="2800" b="1" dirty="0" smtClean="0"/>
-              <a:t>장바구니 </a:t>
-            </a:r>
-            <a:r>
-              <a:rPr lang="ko-KR" altLang="en-US" sz="2800" b="1" dirty="0" smtClean="0"/>
-              <a:t>등</a:t>
+              <a:t>장바구니 등</a:t>
             </a:r>
             <a:r>
               <a:rPr lang="en-US" altLang="ko-KR" sz="2800" b="1" dirty="0"/>

</xml_diff>